<commit_message>
Structural Design Pattern Class Diagram
It contains class diagrams and flowchart related to different structural design patterns.
</commit_message>
<xml_diff>
--- a/StructuralDesignPattern.pptx
+++ b/StructuralDesignPattern.pptx
@@ -108,6 +108,11 @@
       </a:defRPr>
     </a:lvl9pPr>
   </p:defaultTextStyle>
+  <p:extLst>
+    <p:ext uri="{EFAFB233-063F-42B5-8137-9DF3F51BA10A}">
+      <p15:sldGuideLst xmlns:p15="http://schemas.microsoft.com/office/powerpoint/2012/main"/>
+    </p:ext>
+  </p:extLst>
 </p:presentation>
 </file>
 
@@ -260,7 +265,7 @@
           <a:p>
             <a:fld id="{106299E0-53A4-4B2F-B131-1DF156DD99CB}" type="datetimeFigureOut">
               <a:rPr lang="en-IN" smtClean="0"/>
-              <a:t>06-09-2023</a:t>
+              <a:t>08-09-2023</a:t>
             </a:fld>
             <a:endParaRPr lang="en-IN"/>
           </a:p>
@@ -460,7 +465,7 @@
           <a:p>
             <a:fld id="{106299E0-53A4-4B2F-B131-1DF156DD99CB}" type="datetimeFigureOut">
               <a:rPr lang="en-IN" smtClean="0"/>
-              <a:t>06-09-2023</a:t>
+              <a:t>08-09-2023</a:t>
             </a:fld>
             <a:endParaRPr lang="en-IN"/>
           </a:p>
@@ -670,7 +675,7 @@
           <a:p>
             <a:fld id="{106299E0-53A4-4B2F-B131-1DF156DD99CB}" type="datetimeFigureOut">
               <a:rPr lang="en-IN" smtClean="0"/>
-              <a:t>06-09-2023</a:t>
+              <a:t>08-09-2023</a:t>
             </a:fld>
             <a:endParaRPr lang="en-IN"/>
           </a:p>
@@ -870,7 +875,7 @@
           <a:p>
             <a:fld id="{106299E0-53A4-4B2F-B131-1DF156DD99CB}" type="datetimeFigureOut">
               <a:rPr lang="en-IN" smtClean="0"/>
-              <a:t>06-09-2023</a:t>
+              <a:t>08-09-2023</a:t>
             </a:fld>
             <a:endParaRPr lang="en-IN"/>
           </a:p>
@@ -1146,7 +1151,7 @@
           <a:p>
             <a:fld id="{106299E0-53A4-4B2F-B131-1DF156DD99CB}" type="datetimeFigureOut">
               <a:rPr lang="en-IN" smtClean="0"/>
-              <a:t>06-09-2023</a:t>
+              <a:t>08-09-2023</a:t>
             </a:fld>
             <a:endParaRPr lang="en-IN"/>
           </a:p>
@@ -1414,7 +1419,7 @@
           <a:p>
             <a:fld id="{106299E0-53A4-4B2F-B131-1DF156DD99CB}" type="datetimeFigureOut">
               <a:rPr lang="en-IN" smtClean="0"/>
-              <a:t>06-09-2023</a:t>
+              <a:t>08-09-2023</a:t>
             </a:fld>
             <a:endParaRPr lang="en-IN"/>
           </a:p>
@@ -1829,7 +1834,7 @@
           <a:p>
             <a:fld id="{106299E0-53A4-4B2F-B131-1DF156DD99CB}" type="datetimeFigureOut">
               <a:rPr lang="en-IN" smtClean="0"/>
-              <a:t>06-09-2023</a:t>
+              <a:t>08-09-2023</a:t>
             </a:fld>
             <a:endParaRPr lang="en-IN"/>
           </a:p>
@@ -1971,7 +1976,7 @@
           <a:p>
             <a:fld id="{106299E0-53A4-4B2F-B131-1DF156DD99CB}" type="datetimeFigureOut">
               <a:rPr lang="en-IN" smtClean="0"/>
-              <a:t>06-09-2023</a:t>
+              <a:t>08-09-2023</a:t>
             </a:fld>
             <a:endParaRPr lang="en-IN"/>
           </a:p>
@@ -2084,7 +2089,7 @@
           <a:p>
             <a:fld id="{106299E0-53A4-4B2F-B131-1DF156DD99CB}" type="datetimeFigureOut">
               <a:rPr lang="en-IN" smtClean="0"/>
-              <a:t>06-09-2023</a:t>
+              <a:t>08-09-2023</a:t>
             </a:fld>
             <a:endParaRPr lang="en-IN"/>
           </a:p>
@@ -2397,7 +2402,7 @@
           <a:p>
             <a:fld id="{106299E0-53A4-4B2F-B131-1DF156DD99CB}" type="datetimeFigureOut">
               <a:rPr lang="en-IN" smtClean="0"/>
-              <a:t>06-09-2023</a:t>
+              <a:t>08-09-2023</a:t>
             </a:fld>
             <a:endParaRPr lang="en-IN"/>
           </a:p>
@@ -2686,7 +2691,7 @@
           <a:p>
             <a:fld id="{106299E0-53A4-4B2F-B131-1DF156DD99CB}" type="datetimeFigureOut">
               <a:rPr lang="en-IN" smtClean="0"/>
-              <a:t>06-09-2023</a:t>
+              <a:t>08-09-2023</a:t>
             </a:fld>
             <a:endParaRPr lang="en-IN"/>
           </a:p>
@@ -2929,7 +2934,7 @@
           <a:p>
             <a:fld id="{106299E0-53A4-4B2F-B131-1DF156DD99CB}" type="datetimeFigureOut">
               <a:rPr lang="en-IN" smtClean="0"/>
-              <a:t>06-09-2023</a:t>
+              <a:t>08-09-2023</a:t>
             </a:fld>
             <a:endParaRPr lang="en-IN"/>
           </a:p>
@@ -6469,7 +6474,7 @@
         <p:spPr>
           <a:xfrm>
             <a:off x="116360" y="6301946"/>
-            <a:ext cx="2394045" cy="477054"/>
+            <a:ext cx="3126735" cy="477054"/>
           </a:xfrm>
           <a:prstGeom prst="rect">
             <a:avLst/>
@@ -6484,7 +6489,7 @@
           <a:p>
             <a:r>
               <a:rPr lang="en-US" sz="2500" dirty="0"/>
-              <a:t>Facade Pattern</a:t>
+              <a:t>Decorator Pattern</a:t>
             </a:r>
             <a:endParaRPr lang="en-IN" sz="2500" dirty="0"/>
           </a:p>
@@ -6567,7 +6572,7 @@
             <a:pPr algn="ctr"/>
             <a:r>
               <a:rPr lang="en-US" sz="2000" dirty="0" err="1"/>
-              <a:t>IHotel</a:t>
+              <a:t>ITicket</a:t>
             </a:r>
             <a:endParaRPr lang="en-US" sz="2000" dirty="0"/>
           </a:p>
@@ -6581,15 +6586,7 @@
           <a:p>
             <a:r>
               <a:rPr lang="en-US" sz="2000" dirty="0"/>
-              <a:t>- </a:t>
-            </a:r>
-            <a:r>
-              <a:rPr lang="en-US" sz="2000" dirty="0" err="1"/>
-              <a:t>BookHotel</a:t>
-            </a:r>
-            <a:r>
-              <a:rPr lang="en-US" sz="2000" dirty="0"/>
-              <a:t>()</a:t>
+              <a:t>- BookTicket()</a:t>
             </a:r>
           </a:p>
         </p:txBody>
@@ -6605,14 +6602,12 @@
           </p:cNvPr>
           <p:cNvCxnSpPr>
             <a:cxnSpLocks/>
-            <a:stCxn id="44" idx="3"/>
-            <a:endCxn id="5" idx="1"/>
           </p:cNvCxnSpPr>
           <p:nvPr/>
         </p:nvCxnSpPr>
         <p:spPr>
           <a:xfrm>
-            <a:off x="2338086" y="884812"/>
+            <a:off x="2338086" y="882196"/>
             <a:ext cx="1015226" cy="1"/>
           </a:xfrm>
           <a:prstGeom prst="straightConnector1">
@@ -6756,10 +6751,9 @@
           <a:p>
             <a:pPr algn="ctr"/>
             <a:r>
-              <a:rPr lang="en-US" sz="2000" dirty="0" err="1"/>
-              <a:t>ITicket</a:t>
-            </a:r>
-            <a:endParaRPr lang="en-US" sz="2000" dirty="0"/>
+              <a:rPr lang="en-US" sz="2000" dirty="0"/>
+              <a:t>IHotel</a:t>
+            </a:r>
           </a:p>
           <a:p>
             <a:pPr algn="ctr"/>
@@ -6771,15 +6765,7 @@
           <a:p>
             <a:r>
               <a:rPr lang="en-US" sz="2000" dirty="0"/>
-              <a:t>- </a:t>
-            </a:r>
-            <a:r>
-              <a:rPr lang="en-US" sz="2000" dirty="0" err="1"/>
-              <a:t>BookTicket</a:t>
-            </a:r>
-            <a:r>
-              <a:rPr lang="en-US" sz="2000" dirty="0"/>
-              <a:t>()</a:t>
+              <a:t>- BookHotel()</a:t>
             </a:r>
           </a:p>
         </p:txBody>
@@ -6861,7 +6847,7 @@
             <a:pPr algn="ctr"/>
             <a:r>
               <a:rPr lang="en-US" sz="2000" dirty="0"/>
-              <a:t>Hotel</a:t>
+              <a:t>Ticket</a:t>
             </a:r>
           </a:p>
           <a:p>
@@ -6874,15 +6860,7 @@
           <a:p>
             <a:r>
               <a:rPr lang="en-US" sz="2000" dirty="0"/>
-              <a:t>- </a:t>
-            </a:r>
-            <a:r>
-              <a:rPr lang="en-US" sz="2000" dirty="0" err="1"/>
-              <a:t>BookHotel</a:t>
-            </a:r>
-            <a:r>
-              <a:rPr lang="en-US" sz="2000" dirty="0"/>
-              <a:t>()</a:t>
+              <a:t>- BookTicket()</a:t>
             </a:r>
           </a:p>
         </p:txBody>
@@ -6964,7 +6942,7 @@
             <a:pPr algn="ctr"/>
             <a:r>
               <a:rPr lang="en-US" sz="2000" dirty="0"/>
-              <a:t>Ticket</a:t>
+              <a:t>Hotel</a:t>
             </a:r>
           </a:p>
           <a:p>
@@ -6977,15 +6955,7 @@
           <a:p>
             <a:r>
               <a:rPr lang="en-US" sz="2000" dirty="0"/>
-              <a:t>- </a:t>
-            </a:r>
-            <a:r>
-              <a:rPr lang="en-US" sz="2000" dirty="0" err="1"/>
-              <a:t>BookTicket</a:t>
-            </a:r>
-            <a:r>
-              <a:rPr lang="en-US" sz="2000" dirty="0"/>
-              <a:t>()</a:t>
+              <a:t>- BookHotel()</a:t>
             </a:r>
           </a:p>
         </p:txBody>
@@ -7236,7 +7206,7 @@
             <a:pPr algn="ctr"/>
             <a:r>
               <a:rPr lang="en-US" sz="2000" dirty="0" err="1"/>
-              <a:t>IMeal</a:t>
+              <a:t>MealDecorator</a:t>
             </a:r>
             <a:endParaRPr lang="en-US" sz="2000" dirty="0"/>
           </a:p>
@@ -7250,15 +7220,7 @@
           <a:p>
             <a:r>
               <a:rPr lang="en-US" sz="2000" dirty="0"/>
-              <a:t>- </a:t>
-            </a:r>
-            <a:r>
-              <a:rPr lang="en-US" sz="2000" dirty="0" err="1"/>
-              <a:t>SelectMealOption</a:t>
-            </a:r>
-            <a:r>
-              <a:rPr lang="en-US" sz="2000" dirty="0"/>
-              <a:t>()</a:t>
+              <a:t>- BookHotel()</a:t>
             </a:r>
           </a:p>
         </p:txBody>
@@ -7278,7 +7240,7 @@
         <p:spPr>
           <a:xfrm>
             <a:off x="7787550" y="4088515"/>
-            <a:ext cx="2440894" cy="1087782"/>
+            <a:ext cx="1867161" cy="1087782"/>
           </a:xfrm>
           <a:prstGeom prst="rect">
             <a:avLst/>
@@ -7323,8 +7285,8 @@
         </p:nvSpPr>
         <p:spPr>
           <a:xfrm>
-            <a:off x="7814272" y="4059437"/>
-            <a:ext cx="2440895" cy="1015663"/>
+            <a:off x="7799409" y="4160633"/>
+            <a:ext cx="1838248" cy="1015663"/>
           </a:xfrm>
           <a:prstGeom prst="rect">
             <a:avLst/>
@@ -7338,27 +7300,23 @@
           <a:lstStyle/>
           <a:p>
             <a:pPr algn="ctr"/>
+            <a:r>
+              <a:rPr lang="en-US" sz="2000" dirty="0" err="1"/>
+              <a:t>VegMeal</a:t>
+            </a:r>
             <a:endParaRPr lang="en-US" sz="2000" dirty="0"/>
           </a:p>
           <a:p>
             <a:pPr algn="ctr"/>
             <a:r>
               <a:rPr lang="en-US" sz="2000" dirty="0"/>
-              <a:t>----------------------------</a:t>
+              <a:t>----------------</a:t>
             </a:r>
           </a:p>
           <a:p>
             <a:r>
               <a:rPr lang="en-US" sz="2000" dirty="0"/>
-              <a:t>- </a:t>
-            </a:r>
-            <a:r>
-              <a:rPr lang="en-US" sz="2000" dirty="0" err="1"/>
-              <a:t>SelectMealOption</a:t>
-            </a:r>
-            <a:r>
-              <a:rPr lang="en-US" sz="2000" dirty="0"/>
-              <a:t>()</a:t>
+              <a:t>-BookHotel()</a:t>
             </a:r>
           </a:p>
         </p:txBody>
@@ -7377,8 +7335,8 @@
         </p:nvSpPr>
         <p:spPr>
           <a:xfrm>
-            <a:off x="9471435" y="5454121"/>
-            <a:ext cx="2440894" cy="1087782"/>
+            <a:off x="10196074" y="4073854"/>
+            <a:ext cx="1838249" cy="1087782"/>
           </a:xfrm>
           <a:prstGeom prst="rect">
             <a:avLst/>
@@ -7423,8 +7381,8 @@
         </p:nvSpPr>
         <p:spPr>
           <a:xfrm>
-            <a:off x="9498157" y="5425043"/>
-            <a:ext cx="2440895" cy="1015663"/>
+            <a:off x="10222797" y="4059437"/>
+            <a:ext cx="1812715" cy="1015663"/>
           </a:xfrm>
           <a:prstGeom prst="rect">
             <a:avLst/>
@@ -7440,7 +7398,7 @@
             <a:pPr algn="ctr"/>
             <a:r>
               <a:rPr lang="en-US" sz="2000" dirty="0" err="1"/>
-              <a:t>IMeal</a:t>
+              <a:t>NonVegMeal</a:t>
             </a:r>
             <a:endParaRPr lang="en-US" sz="2000" dirty="0"/>
           </a:p>
@@ -7448,7 +7406,7 @@
             <a:pPr algn="ctr"/>
             <a:r>
               <a:rPr lang="en-US" sz="2000" dirty="0"/>
-              <a:t>----------------------------</a:t>
+              <a:t>--------------------</a:t>
             </a:r>
           </a:p>
           <a:p>
@@ -7458,7 +7416,7 @@
             </a:r>
             <a:r>
               <a:rPr lang="en-US" sz="2000" dirty="0" err="1"/>
-              <a:t>SelectMealOption</a:t>
+              <a:t>BookMeal</a:t>
             </a:r>
             <a:r>
               <a:rPr lang="en-US" sz="2000" dirty="0"/>
@@ -7467,6 +7425,174 @@
           </a:p>
         </p:txBody>
       </p:sp>
+      <p:cxnSp>
+        <p:nvCxnSpPr>
+          <p:cNvPr id="10" name="Straight Arrow Connector 9">
+            <a:extLst>
+              <a:ext uri="{FF2B5EF4-FFF2-40B4-BE49-F238E27FC236}">
+                <a16:creationId xmlns:a16="http://schemas.microsoft.com/office/drawing/2014/main" id="{A1DA8025-FC54-561B-F35A-113FC14D1B88}"/>
+              </a:ext>
+            </a:extLst>
+          </p:cNvPr>
+          <p:cNvCxnSpPr>
+            <a:cxnSpLocks/>
+            <a:stCxn id="7" idx="0"/>
+            <a:endCxn id="2" idx="2"/>
+          </p:cNvCxnSpPr>
+          <p:nvPr/>
+        </p:nvCxnSpPr>
+        <p:spPr>
+          <a:xfrm flipV="1">
+            <a:off x="8718533" y="3521167"/>
+            <a:ext cx="1153962" cy="639466"/>
+          </a:xfrm>
+          <a:prstGeom prst="straightConnector1">
+            <a:avLst/>
+          </a:prstGeom>
+          <a:ln>
+            <a:tailEnd type="triangle"/>
+          </a:ln>
+        </p:spPr>
+        <p:style>
+          <a:lnRef idx="1">
+            <a:schemeClr val="accent1"/>
+          </a:lnRef>
+          <a:fillRef idx="0">
+            <a:schemeClr val="accent1"/>
+          </a:fillRef>
+          <a:effectRef idx="0">
+            <a:schemeClr val="accent1"/>
+          </a:effectRef>
+          <a:fontRef idx="minor">
+            <a:schemeClr val="tx1"/>
+          </a:fontRef>
+        </p:style>
+      </p:cxnSp>
+      <p:cxnSp>
+        <p:nvCxnSpPr>
+          <p:cNvPr id="23" name="Straight Arrow Connector 22">
+            <a:extLst>
+              <a:ext uri="{FF2B5EF4-FFF2-40B4-BE49-F238E27FC236}">
+                <a16:creationId xmlns:a16="http://schemas.microsoft.com/office/drawing/2014/main" id="{80BC7165-DA14-0945-CF60-0AF2CC61991F}"/>
+              </a:ext>
+            </a:extLst>
+          </p:cNvPr>
+          <p:cNvCxnSpPr>
+            <a:cxnSpLocks/>
+            <a:stCxn id="9" idx="0"/>
+            <a:endCxn id="2" idx="2"/>
+          </p:cNvCxnSpPr>
+          <p:nvPr/>
+        </p:nvCxnSpPr>
+        <p:spPr>
+          <a:xfrm flipH="1" flipV="1">
+            <a:off x="9872495" y="3521167"/>
+            <a:ext cx="1256660" cy="538270"/>
+          </a:xfrm>
+          <a:prstGeom prst="straightConnector1">
+            <a:avLst/>
+          </a:prstGeom>
+          <a:ln>
+            <a:tailEnd type="triangle"/>
+          </a:ln>
+        </p:spPr>
+        <p:style>
+          <a:lnRef idx="1">
+            <a:schemeClr val="accent1"/>
+          </a:lnRef>
+          <a:fillRef idx="0">
+            <a:schemeClr val="accent1"/>
+          </a:fillRef>
+          <a:effectRef idx="0">
+            <a:schemeClr val="accent1"/>
+          </a:effectRef>
+          <a:fontRef idx="minor">
+            <a:schemeClr val="tx1"/>
+          </a:fontRef>
+        </p:style>
+      </p:cxnSp>
+      <p:cxnSp>
+        <p:nvCxnSpPr>
+          <p:cNvPr id="28" name="Straight Arrow Connector 27">
+            <a:extLst>
+              <a:ext uri="{FF2B5EF4-FFF2-40B4-BE49-F238E27FC236}">
+                <a16:creationId xmlns:a16="http://schemas.microsoft.com/office/drawing/2014/main" id="{D64804E4-CB4A-8A21-643D-904AF6FD8223}"/>
+              </a:ext>
+            </a:extLst>
+          </p:cNvPr>
+          <p:cNvCxnSpPr>
+            <a:cxnSpLocks/>
+          </p:cNvCxnSpPr>
+          <p:nvPr/>
+        </p:nvCxnSpPr>
+        <p:spPr>
+          <a:xfrm>
+            <a:off x="2338086" y="884812"/>
+            <a:ext cx="1015226" cy="1"/>
+          </a:xfrm>
+          <a:prstGeom prst="straightConnector1">
+            <a:avLst/>
+          </a:prstGeom>
+          <a:ln>
+            <a:tailEnd type="triangle"/>
+          </a:ln>
+        </p:spPr>
+        <p:style>
+          <a:lnRef idx="1">
+            <a:schemeClr val="accent1"/>
+          </a:lnRef>
+          <a:fillRef idx="0">
+            <a:schemeClr val="accent1"/>
+          </a:fillRef>
+          <a:effectRef idx="0">
+            <a:schemeClr val="accent1"/>
+          </a:effectRef>
+          <a:fontRef idx="minor">
+            <a:schemeClr val="tx1"/>
+          </a:fontRef>
+        </p:style>
+      </p:cxnSp>
+      <p:cxnSp>
+        <p:nvCxnSpPr>
+          <p:cNvPr id="29" name="Straight Arrow Connector 28">
+            <a:extLst>
+              <a:ext uri="{FF2B5EF4-FFF2-40B4-BE49-F238E27FC236}">
+                <a16:creationId xmlns:a16="http://schemas.microsoft.com/office/drawing/2014/main" id="{78C3ECAD-1B57-6B96-97EC-DDF330306025}"/>
+              </a:ext>
+            </a:extLst>
+          </p:cNvPr>
+          <p:cNvCxnSpPr>
+            <a:cxnSpLocks/>
+          </p:cNvCxnSpPr>
+          <p:nvPr/>
+        </p:nvCxnSpPr>
+        <p:spPr>
+          <a:xfrm flipH="1">
+            <a:off x="7303086" y="2912138"/>
+            <a:ext cx="1375684" cy="29078"/>
+          </a:xfrm>
+          <a:prstGeom prst="straightConnector1">
+            <a:avLst/>
+          </a:prstGeom>
+          <a:ln>
+            <a:tailEnd type="triangle"/>
+          </a:ln>
+        </p:spPr>
+        <p:style>
+          <a:lnRef idx="1">
+            <a:schemeClr val="accent1"/>
+          </a:lnRef>
+          <a:fillRef idx="0">
+            <a:schemeClr val="accent1"/>
+          </a:fillRef>
+          <a:effectRef idx="0">
+            <a:schemeClr val="accent1"/>
+          </a:effectRef>
+          <a:fontRef idx="minor">
+            <a:schemeClr val="tx1"/>
+          </a:fontRef>
+        </p:style>
+      </p:cxnSp>
     </p:spTree>
     <p:extLst>
       <p:ext uri="{BB962C8B-B14F-4D97-AF65-F5344CB8AC3E}">

</xml_diff>